<commit_message>
feat(ppt-font-fix): Add AnalyzeFontsAsync in FontFixService for identify usage of fonts
</commit_message>
<xml_diff>
--- a/ppt-font-fix/src/McpSamples.PptFontFix.HybridApp/test.pptx
+++ b/ppt-font-fix/src/McpSamples.PptFontFix.HybridApp/test.pptx
@@ -6,6 +6,10 @@
   </p:sldMasterIdLst>
   <p:sldIdLst>
     <p:sldId id="256" r:id="rId2"/>
+    <p:sldId id="257" r:id="rId3"/>
+    <p:sldId id="258" r:id="rId4"/>
+    <p:sldId id="259" r:id="rId5"/>
+    <p:sldId id="260" r:id="rId6"/>
   </p:sldIdLst>
   <p:sldSz cx="12192000" cy="6858000"/>
   <p:notesSz cx="6858000" cy="9144000"/>
@@ -259,7 +263,7 @@
           <a:p>
             <a:fld id="{B31BD231-2301-4685-AEBB-D3A67C140D6E}" type="datetimeFigureOut">
               <a:rPr lang="ko-KR" altLang="en-US" smtClean="0"/>
-              <a:t>2025-10-14</a:t>
+              <a:t>2025-11-02</a:t>
             </a:fld>
             <a:endParaRPr lang="ko-KR" altLang="en-US"/>
           </a:p>
@@ -457,7 +461,7 @@
           <a:p>
             <a:fld id="{B31BD231-2301-4685-AEBB-D3A67C140D6E}" type="datetimeFigureOut">
               <a:rPr lang="ko-KR" altLang="en-US" smtClean="0"/>
-              <a:t>2025-10-14</a:t>
+              <a:t>2025-11-02</a:t>
             </a:fld>
             <a:endParaRPr lang="ko-KR" altLang="en-US"/>
           </a:p>
@@ -665,7 +669,7 @@
           <a:p>
             <a:fld id="{B31BD231-2301-4685-AEBB-D3A67C140D6E}" type="datetimeFigureOut">
               <a:rPr lang="ko-KR" altLang="en-US" smtClean="0"/>
-              <a:t>2025-10-14</a:t>
+              <a:t>2025-11-02</a:t>
             </a:fld>
             <a:endParaRPr lang="ko-KR" altLang="en-US"/>
           </a:p>
@@ -863,7 +867,7 @@
           <a:p>
             <a:fld id="{B31BD231-2301-4685-AEBB-D3A67C140D6E}" type="datetimeFigureOut">
               <a:rPr lang="ko-KR" altLang="en-US" smtClean="0"/>
-              <a:t>2025-10-14</a:t>
+              <a:t>2025-11-02</a:t>
             </a:fld>
             <a:endParaRPr lang="ko-KR" altLang="en-US"/>
           </a:p>
@@ -1138,7 +1142,7 @@
           <a:p>
             <a:fld id="{B31BD231-2301-4685-AEBB-D3A67C140D6E}" type="datetimeFigureOut">
               <a:rPr lang="ko-KR" altLang="en-US" smtClean="0"/>
-              <a:t>2025-10-14</a:t>
+              <a:t>2025-11-02</a:t>
             </a:fld>
             <a:endParaRPr lang="ko-KR" altLang="en-US"/>
           </a:p>
@@ -1165,7 +1169,7 @@
           <a:bodyPr/>
           <a:lstStyle/>
           <a:p>
-            <a:endParaRPr lang="ko-KR" altLang="en-US"/>
+            <a:endParaRPr lang="ko-KR" altLang="en-US" dirty="0"/>
           </a:p>
         </p:txBody>
       </p:sp>
@@ -1403,7 +1407,7 @@
           <a:p>
             <a:fld id="{B31BD231-2301-4685-AEBB-D3A67C140D6E}" type="datetimeFigureOut">
               <a:rPr lang="ko-KR" altLang="en-US" smtClean="0"/>
-              <a:t>2025-10-14</a:t>
+              <a:t>2025-11-02</a:t>
             </a:fld>
             <a:endParaRPr lang="ko-KR" altLang="en-US"/>
           </a:p>
@@ -1815,7 +1819,7 @@
           <a:p>
             <a:fld id="{B31BD231-2301-4685-AEBB-D3A67C140D6E}" type="datetimeFigureOut">
               <a:rPr lang="ko-KR" altLang="en-US" smtClean="0"/>
-              <a:t>2025-10-14</a:t>
+              <a:t>2025-11-02</a:t>
             </a:fld>
             <a:endParaRPr lang="ko-KR" altLang="en-US"/>
           </a:p>
@@ -1956,7 +1960,7 @@
           <a:p>
             <a:fld id="{B31BD231-2301-4685-AEBB-D3A67C140D6E}" type="datetimeFigureOut">
               <a:rPr lang="ko-KR" altLang="en-US" smtClean="0"/>
-              <a:t>2025-10-14</a:t>
+              <a:t>2025-11-02</a:t>
             </a:fld>
             <a:endParaRPr lang="ko-KR" altLang="en-US"/>
           </a:p>
@@ -2069,7 +2073,7 @@
           <a:p>
             <a:fld id="{B31BD231-2301-4685-AEBB-D3A67C140D6E}" type="datetimeFigureOut">
               <a:rPr lang="ko-KR" altLang="en-US" smtClean="0"/>
-              <a:t>2025-10-14</a:t>
+              <a:t>2025-11-02</a:t>
             </a:fld>
             <a:endParaRPr lang="ko-KR" altLang="en-US"/>
           </a:p>
@@ -2380,7 +2384,7 @@
           <a:p>
             <a:fld id="{B31BD231-2301-4685-AEBB-D3A67C140D6E}" type="datetimeFigureOut">
               <a:rPr lang="ko-KR" altLang="en-US" smtClean="0"/>
-              <a:t>2025-10-14</a:t>
+              <a:t>2025-11-02</a:t>
             </a:fld>
             <a:endParaRPr lang="ko-KR" altLang="en-US"/>
           </a:p>
@@ -2668,7 +2672,7 @@
           <a:p>
             <a:fld id="{B31BD231-2301-4685-AEBB-D3A67C140D6E}" type="datetimeFigureOut">
               <a:rPr lang="ko-KR" altLang="en-US" smtClean="0"/>
-              <a:t>2025-10-14</a:t>
+              <a:t>2025-11-02</a:t>
             </a:fld>
             <a:endParaRPr lang="ko-KR" altLang="en-US"/>
           </a:p>
@@ -2909,7 +2913,7 @@
           <a:p>
             <a:fld id="{B31BD231-2301-4685-AEBB-D3A67C140D6E}" type="datetimeFigureOut">
               <a:rPr lang="ko-KR" altLang="en-US" smtClean="0"/>
-              <a:t>2025-10-14</a:t>
+              <a:t>2025-11-02</a:t>
             </a:fld>
             <a:endParaRPr lang="ko-KR" altLang="en-US"/>
           </a:p>
@@ -3390,10 +3394,530 @@
           </a:p>
         </p:txBody>
       </p:sp>
+      <p:sp>
+        <p:nvSpPr>
+          <p:cNvPr id="4" name="TextBox 3">
+            <a:extLst>
+              <a:ext uri="{FF2B5EF4-FFF2-40B4-BE49-F238E27FC236}">
+                <a16:creationId xmlns:a16="http://schemas.microsoft.com/office/drawing/2014/main" id="{68C22003-C756-5EFE-C350-8EAD167E06CC}"/>
+              </a:ext>
+            </a:extLst>
+          </p:cNvPr>
+          <p:cNvSpPr txBox="1"/>
+          <p:nvPr/>
+        </p:nvSpPr>
+        <p:spPr>
+          <a:xfrm>
+            <a:off x="-960119" y="-895350"/>
+            <a:ext cx="3246119" cy="369332"/>
+          </a:xfrm>
+          <a:prstGeom prst="rect">
+            <a:avLst/>
+          </a:prstGeom>
+          <a:noFill/>
+        </p:spPr>
+        <p:txBody>
+          <a:bodyPr wrap="square" rtlCol="0">
+            <a:spAutoFit/>
+          </a:bodyPr>
+          <a:lstStyle/>
+          <a:p>
+            <a:r>
+              <a:rPr lang="en-US" altLang="ko-KR" dirty="0">
+                <a:latin typeface="Arial" panose="020B0604020202020204" pitchFamily="34" charset="0"/>
+                <a:cs typeface="Arial" panose="020B0604020202020204" pitchFamily="34" charset="0"/>
+              </a:rPr>
+              <a:t>Outside text</a:t>
+            </a:r>
+            <a:endParaRPr lang="ko-KR" altLang="en-US" dirty="0">
+              <a:latin typeface="Arial" panose="020B0604020202020204" pitchFamily="34" charset="0"/>
+              <a:cs typeface="Arial" panose="020B0604020202020204" pitchFamily="34" charset="0"/>
+            </a:endParaRPr>
+          </a:p>
+        </p:txBody>
+      </p:sp>
     </p:spTree>
     <p:extLst>
       <p:ext uri="{BB962C8B-B14F-4D97-AF65-F5344CB8AC3E}">
         <p14:creationId xmlns:p14="http://schemas.microsoft.com/office/powerpoint/2010/main" val="2583165737"/>
+      </p:ext>
+    </p:extLst>
+  </p:cSld>
+  <p:clrMapOvr>
+    <a:masterClrMapping/>
+  </p:clrMapOvr>
+</p:sld>
+</file>
+
+<file path=ppt/slides/slide2.xml><?xml version="1.0" encoding="utf-8"?>
+<p:sld xmlns:a="http://schemas.openxmlformats.org/drawingml/2006/main" xmlns:r="http://schemas.openxmlformats.org/officeDocument/2006/relationships" xmlns:p="http://schemas.openxmlformats.org/presentationml/2006/main">
+  <p:cSld>
+    <p:spTree>
+      <p:nvGrpSpPr>
+        <p:cNvPr id="1" name="">
+          <a:extLst>
+            <a:ext uri="{FF2B5EF4-FFF2-40B4-BE49-F238E27FC236}">
+              <a16:creationId xmlns:a16="http://schemas.microsoft.com/office/drawing/2014/main" id="{3C1D0E2B-907D-3B65-7094-F4D79C3F607D}"/>
+            </a:ext>
+          </a:extLst>
+        </p:cNvPr>
+        <p:cNvGrpSpPr/>
+        <p:nvPr/>
+      </p:nvGrpSpPr>
+      <p:grpSpPr>
+        <a:xfrm>
+          <a:off x="0" y="0"/>
+          <a:ext cx="0" cy="0"/>
+          <a:chOff x="0" y="0"/>
+          <a:chExt cx="0" cy="0"/>
+        </a:xfrm>
+      </p:grpSpPr>
+      <p:sp>
+        <p:nvSpPr>
+          <p:cNvPr id="2" name="제목 1">
+            <a:extLst>
+              <a:ext uri="{FF2B5EF4-FFF2-40B4-BE49-F238E27FC236}">
+                <a16:creationId xmlns:a16="http://schemas.microsoft.com/office/drawing/2014/main" id="{BA80C5E1-7E0E-32E5-F854-954A781599E6}"/>
+              </a:ext>
+            </a:extLst>
+          </p:cNvPr>
+          <p:cNvSpPr>
+            <a:spLocks noGrp="1"/>
+          </p:cNvSpPr>
+          <p:nvPr>
+            <p:ph type="ctrTitle"/>
+          </p:nvPr>
+        </p:nvSpPr>
+        <p:spPr/>
+        <p:txBody>
+          <a:bodyPr/>
+          <a:lstStyle/>
+          <a:p>
+            <a:r>
+              <a:rPr lang="en-US" altLang="ko-KR" dirty="0"/>
+              <a:t>TEST TEXT</a:t>
+            </a:r>
+            <a:endParaRPr lang="ko-KR" altLang="en-US" dirty="0"/>
+          </a:p>
+        </p:txBody>
+      </p:sp>
+      <p:sp>
+        <p:nvSpPr>
+          <p:cNvPr id="3" name="부제목 2">
+            <a:extLst>
+              <a:ext uri="{FF2B5EF4-FFF2-40B4-BE49-F238E27FC236}">
+                <a16:creationId xmlns:a16="http://schemas.microsoft.com/office/drawing/2014/main" id="{A62A5500-8C23-97E6-100B-76F26731C8C0}"/>
+              </a:ext>
+            </a:extLst>
+          </p:cNvPr>
+          <p:cNvSpPr>
+            <a:spLocks noGrp="1"/>
+          </p:cNvSpPr>
+          <p:nvPr>
+            <p:ph type="subTitle" idx="1"/>
+          </p:nvPr>
+        </p:nvSpPr>
+        <p:spPr/>
+        <p:txBody>
+          <a:bodyPr/>
+          <a:lstStyle/>
+          <a:p>
+            <a:r>
+              <a:rPr lang="en-US" altLang="ko-KR" dirty="0">
+                <a:latin typeface="HY동녘M" panose="02030600000101010101" pitchFamily="18" charset="-127"/>
+                <a:ea typeface="HY동녘M" panose="02030600000101010101" pitchFamily="18" charset="-127"/>
+              </a:rPr>
+              <a:t>TEST TEXT</a:t>
+            </a:r>
+            <a:endParaRPr lang="ko-KR" altLang="en-US" dirty="0">
+              <a:latin typeface="HY동녘M" panose="02030600000101010101" pitchFamily="18" charset="-127"/>
+              <a:ea typeface="HY동녘M" panose="02030600000101010101" pitchFamily="18" charset="-127"/>
+            </a:endParaRPr>
+          </a:p>
+        </p:txBody>
+      </p:sp>
+    </p:spTree>
+    <p:extLst>
+      <p:ext uri="{BB962C8B-B14F-4D97-AF65-F5344CB8AC3E}">
+        <p14:creationId xmlns:p14="http://schemas.microsoft.com/office/powerpoint/2010/main" val="561029022"/>
+      </p:ext>
+    </p:extLst>
+  </p:cSld>
+  <p:clrMapOvr>
+    <a:masterClrMapping/>
+  </p:clrMapOvr>
+</p:sld>
+</file>
+
+<file path=ppt/slides/slide3.xml><?xml version="1.0" encoding="utf-8"?>
+<p:sld xmlns:a="http://schemas.openxmlformats.org/drawingml/2006/main" xmlns:r="http://schemas.openxmlformats.org/officeDocument/2006/relationships" xmlns:p="http://schemas.openxmlformats.org/presentationml/2006/main">
+  <p:cSld>
+    <p:spTree>
+      <p:nvGrpSpPr>
+        <p:cNvPr id="1" name="">
+          <a:extLst>
+            <a:ext uri="{FF2B5EF4-FFF2-40B4-BE49-F238E27FC236}">
+              <a16:creationId xmlns:a16="http://schemas.microsoft.com/office/drawing/2014/main" id="{6754A27F-D399-F9D4-2D36-9343813E3FD7}"/>
+            </a:ext>
+          </a:extLst>
+        </p:cNvPr>
+        <p:cNvGrpSpPr/>
+        <p:nvPr/>
+      </p:nvGrpSpPr>
+      <p:grpSpPr>
+        <a:xfrm>
+          <a:off x="0" y="0"/>
+          <a:ext cx="0" cy="0"/>
+          <a:chOff x="0" y="0"/>
+          <a:chExt cx="0" cy="0"/>
+        </a:xfrm>
+      </p:grpSpPr>
+      <p:sp>
+        <p:nvSpPr>
+          <p:cNvPr id="2" name="제목 1">
+            <a:extLst>
+              <a:ext uri="{FF2B5EF4-FFF2-40B4-BE49-F238E27FC236}">
+                <a16:creationId xmlns:a16="http://schemas.microsoft.com/office/drawing/2014/main" id="{A5E5602C-F082-728C-9F0E-B17B704B7808}"/>
+              </a:ext>
+            </a:extLst>
+          </p:cNvPr>
+          <p:cNvSpPr>
+            <a:spLocks noGrp="1"/>
+          </p:cNvSpPr>
+          <p:nvPr>
+            <p:ph type="ctrTitle"/>
+          </p:nvPr>
+        </p:nvSpPr>
+        <p:spPr/>
+        <p:txBody>
+          <a:bodyPr/>
+          <a:lstStyle/>
+          <a:p>
+            <a:r>
+              <a:rPr lang="en-US" altLang="ko-KR" dirty="0"/>
+              <a:t>TEST TEXT</a:t>
+            </a:r>
+            <a:endParaRPr lang="ko-KR" altLang="en-US" dirty="0"/>
+          </a:p>
+        </p:txBody>
+      </p:sp>
+      <p:sp>
+        <p:nvSpPr>
+          <p:cNvPr id="3" name="부제목 2">
+            <a:extLst>
+              <a:ext uri="{FF2B5EF4-FFF2-40B4-BE49-F238E27FC236}">
+                <a16:creationId xmlns:a16="http://schemas.microsoft.com/office/drawing/2014/main" id="{42E62DB8-BCF5-5107-2D8C-6F39F22E1897}"/>
+              </a:ext>
+            </a:extLst>
+          </p:cNvPr>
+          <p:cNvSpPr>
+            <a:spLocks noGrp="1"/>
+          </p:cNvSpPr>
+          <p:nvPr>
+            <p:ph type="subTitle" idx="1"/>
+          </p:nvPr>
+        </p:nvSpPr>
+        <p:spPr/>
+        <p:txBody>
+          <a:bodyPr/>
+          <a:lstStyle/>
+          <a:p>
+            <a:r>
+              <a:rPr lang="en-US" altLang="ko-KR" dirty="0">
+                <a:latin typeface="HY동녘M" panose="02030600000101010101" pitchFamily="18" charset="-127"/>
+                <a:ea typeface="HY동녘M" panose="02030600000101010101" pitchFamily="18" charset="-127"/>
+              </a:rPr>
+              <a:t>TEST TEXT</a:t>
+            </a:r>
+            <a:endParaRPr lang="ko-KR" altLang="en-US" dirty="0">
+              <a:latin typeface="HY동녘M" panose="02030600000101010101" pitchFamily="18" charset="-127"/>
+              <a:ea typeface="HY동녘M" panose="02030600000101010101" pitchFamily="18" charset="-127"/>
+            </a:endParaRPr>
+          </a:p>
+        </p:txBody>
+      </p:sp>
+      <p:sp>
+        <p:nvSpPr>
+          <p:cNvPr id="5" name="TextBox 1">
+            <a:extLst>
+              <a:ext uri="{FF2B5EF4-FFF2-40B4-BE49-F238E27FC236}">
+                <a16:creationId xmlns:a16="http://schemas.microsoft.com/office/drawing/2014/main" id="{732C07BF-AA76-77BB-C182-69E42D580DFD}"/>
+              </a:ext>
+            </a:extLst>
+          </p:cNvPr>
+          <p:cNvSpPr txBox="1"/>
+          <p:nvPr/>
+        </p:nvSpPr>
+        <p:spPr>
+          <a:xfrm>
+            <a:off x="838200" y="590550"/>
+            <a:ext cx="3269974" cy="1077218"/>
+          </a:xfrm>
+          <a:prstGeom prst="rect">
+            <a:avLst/>
+          </a:prstGeom>
+          <a:noFill/>
+        </p:spPr>
+        <p:txBody>
+          <a:bodyPr wrap="square" rtlCol="0">
+            <a:spAutoFit/>
+          </a:bodyPr>
+          <a:lstStyle/>
+          <a:p>
+            <a:r>
+              <a:rPr lang="en-US" altLang="ko-KR" sz="3200" b="1" dirty="0">
+                <a:latin typeface="궁서체" panose="02030609000101010101" pitchFamily="17" charset="-127"/>
+                <a:ea typeface="궁서체" panose="02030609000101010101" pitchFamily="17" charset="-127"/>
+              </a:rPr>
+              <a:t>Inconsistently used font</a:t>
+            </a:r>
+            <a:endParaRPr lang="ko-KR" altLang="en-US" sz="3200" b="1" dirty="0">
+              <a:latin typeface="궁서체" panose="02030609000101010101" pitchFamily="17" charset="-127"/>
+              <a:ea typeface="궁서체" panose="02030609000101010101" pitchFamily="17" charset="-127"/>
+            </a:endParaRPr>
+          </a:p>
+        </p:txBody>
+      </p:sp>
+    </p:spTree>
+    <p:extLst>
+      <p:ext uri="{BB962C8B-B14F-4D97-AF65-F5344CB8AC3E}">
+        <p14:creationId xmlns:p14="http://schemas.microsoft.com/office/powerpoint/2010/main" val="2600430146"/>
+      </p:ext>
+    </p:extLst>
+  </p:cSld>
+  <p:clrMapOvr>
+    <a:masterClrMapping/>
+  </p:clrMapOvr>
+</p:sld>
+</file>
+
+<file path=ppt/slides/slide4.xml><?xml version="1.0" encoding="utf-8"?>
+<p:sld xmlns:a="http://schemas.openxmlformats.org/drawingml/2006/main" xmlns:r="http://schemas.openxmlformats.org/officeDocument/2006/relationships" xmlns:p="http://schemas.openxmlformats.org/presentationml/2006/main">
+  <p:cSld>
+    <p:spTree>
+      <p:nvGrpSpPr>
+        <p:cNvPr id="1" name="">
+          <a:extLst>
+            <a:ext uri="{FF2B5EF4-FFF2-40B4-BE49-F238E27FC236}">
+              <a16:creationId xmlns:a16="http://schemas.microsoft.com/office/drawing/2014/main" id="{F1C765D7-9D13-4A6F-91D2-21E73289503F}"/>
+            </a:ext>
+          </a:extLst>
+        </p:cNvPr>
+        <p:cNvGrpSpPr/>
+        <p:nvPr/>
+      </p:nvGrpSpPr>
+      <p:grpSpPr>
+        <a:xfrm>
+          <a:off x="0" y="0"/>
+          <a:ext cx="0" cy="0"/>
+          <a:chOff x="0" y="0"/>
+          <a:chExt cx="0" cy="0"/>
+        </a:xfrm>
+      </p:grpSpPr>
+      <p:sp>
+        <p:nvSpPr>
+          <p:cNvPr id="2" name="제목 1">
+            <a:extLst>
+              <a:ext uri="{FF2B5EF4-FFF2-40B4-BE49-F238E27FC236}">
+                <a16:creationId xmlns:a16="http://schemas.microsoft.com/office/drawing/2014/main" id="{06C04CA6-2607-7209-D701-166406AC5248}"/>
+              </a:ext>
+            </a:extLst>
+          </p:cNvPr>
+          <p:cNvSpPr>
+            <a:spLocks noGrp="1"/>
+          </p:cNvSpPr>
+          <p:nvPr>
+            <p:ph type="ctrTitle"/>
+          </p:nvPr>
+        </p:nvSpPr>
+        <p:spPr/>
+        <p:txBody>
+          <a:bodyPr/>
+          <a:lstStyle/>
+          <a:p>
+            <a:r>
+              <a:rPr lang="en-US" altLang="ko-KR" dirty="0"/>
+              <a:t>TEST TEXT</a:t>
+            </a:r>
+            <a:endParaRPr lang="ko-KR" altLang="en-US" dirty="0"/>
+          </a:p>
+        </p:txBody>
+      </p:sp>
+      <p:sp>
+        <p:nvSpPr>
+          <p:cNvPr id="3" name="부제목 2">
+            <a:extLst>
+              <a:ext uri="{FF2B5EF4-FFF2-40B4-BE49-F238E27FC236}">
+                <a16:creationId xmlns:a16="http://schemas.microsoft.com/office/drawing/2014/main" id="{DBFA49A2-B1AA-DD9F-4993-F5C77E475EB2}"/>
+              </a:ext>
+            </a:extLst>
+          </p:cNvPr>
+          <p:cNvSpPr>
+            <a:spLocks noGrp="1"/>
+          </p:cNvSpPr>
+          <p:nvPr>
+            <p:ph type="subTitle" idx="1"/>
+          </p:nvPr>
+        </p:nvSpPr>
+        <p:spPr/>
+        <p:txBody>
+          <a:bodyPr/>
+          <a:lstStyle/>
+          <a:p>
+            <a:r>
+              <a:rPr lang="en-US" altLang="ko-KR" dirty="0">
+                <a:latin typeface="HY동녘M" panose="02030600000101010101" pitchFamily="18" charset="-127"/>
+                <a:ea typeface="HY동녘M" panose="02030600000101010101" pitchFamily="18" charset="-127"/>
+              </a:rPr>
+              <a:t>TEST TEXT</a:t>
+            </a:r>
+            <a:endParaRPr lang="ko-KR" altLang="en-US" dirty="0">
+              <a:latin typeface="HY동녘M" panose="02030600000101010101" pitchFamily="18" charset="-127"/>
+              <a:ea typeface="HY동녘M" panose="02030600000101010101" pitchFamily="18" charset="-127"/>
+            </a:endParaRPr>
+          </a:p>
+        </p:txBody>
+      </p:sp>
+    </p:spTree>
+    <p:extLst>
+      <p:ext uri="{BB962C8B-B14F-4D97-AF65-F5344CB8AC3E}">
+        <p14:creationId xmlns:p14="http://schemas.microsoft.com/office/powerpoint/2010/main" val="1282941413"/>
+      </p:ext>
+    </p:extLst>
+  </p:cSld>
+  <p:clrMapOvr>
+    <a:masterClrMapping/>
+  </p:clrMapOvr>
+</p:sld>
+</file>
+
+<file path=ppt/slides/slide5.xml><?xml version="1.0" encoding="utf-8"?>
+<p:sld xmlns:a="http://schemas.openxmlformats.org/drawingml/2006/main" xmlns:r="http://schemas.openxmlformats.org/officeDocument/2006/relationships" xmlns:p="http://schemas.openxmlformats.org/presentationml/2006/main">
+  <p:cSld>
+    <p:spTree>
+      <p:nvGrpSpPr>
+        <p:cNvPr id="1" name="">
+          <a:extLst>
+            <a:ext uri="{FF2B5EF4-FFF2-40B4-BE49-F238E27FC236}">
+              <a16:creationId xmlns:a16="http://schemas.microsoft.com/office/drawing/2014/main" id="{D58DBBD4-29B2-A16C-3EFB-98FC44A8FCF5}"/>
+            </a:ext>
+          </a:extLst>
+        </p:cNvPr>
+        <p:cNvGrpSpPr/>
+        <p:nvPr/>
+      </p:nvGrpSpPr>
+      <p:grpSpPr>
+        <a:xfrm>
+          <a:off x="0" y="0"/>
+          <a:ext cx="0" cy="0"/>
+          <a:chOff x="0" y="0"/>
+          <a:chExt cx="0" cy="0"/>
+        </a:xfrm>
+      </p:grpSpPr>
+      <p:sp>
+        <p:nvSpPr>
+          <p:cNvPr id="2" name="제목 1">
+            <a:extLst>
+              <a:ext uri="{FF2B5EF4-FFF2-40B4-BE49-F238E27FC236}">
+                <a16:creationId xmlns:a16="http://schemas.microsoft.com/office/drawing/2014/main" id="{DEA2C9A4-85BD-32FF-D161-F67C582CAD07}"/>
+              </a:ext>
+            </a:extLst>
+          </p:cNvPr>
+          <p:cNvSpPr>
+            <a:spLocks noGrp="1"/>
+          </p:cNvSpPr>
+          <p:nvPr>
+            <p:ph type="ctrTitle"/>
+          </p:nvPr>
+        </p:nvSpPr>
+        <p:spPr/>
+        <p:txBody>
+          <a:bodyPr/>
+          <a:lstStyle/>
+          <a:p>
+            <a:r>
+              <a:rPr lang="en-US" altLang="ko-KR" dirty="0"/>
+              <a:t>TEST TEXT</a:t>
+            </a:r>
+            <a:endParaRPr lang="ko-KR" altLang="en-US" dirty="0"/>
+          </a:p>
+        </p:txBody>
+      </p:sp>
+      <p:sp>
+        <p:nvSpPr>
+          <p:cNvPr id="3" name="부제목 2">
+            <a:extLst>
+              <a:ext uri="{FF2B5EF4-FFF2-40B4-BE49-F238E27FC236}">
+                <a16:creationId xmlns:a16="http://schemas.microsoft.com/office/drawing/2014/main" id="{CD98E549-4B67-7971-996C-3E811711488E}"/>
+              </a:ext>
+            </a:extLst>
+          </p:cNvPr>
+          <p:cNvSpPr>
+            <a:spLocks noGrp="1"/>
+          </p:cNvSpPr>
+          <p:nvPr>
+            <p:ph type="subTitle" idx="1"/>
+          </p:nvPr>
+        </p:nvSpPr>
+        <p:spPr/>
+        <p:txBody>
+          <a:bodyPr/>
+          <a:lstStyle/>
+          <a:p>
+            <a:r>
+              <a:rPr lang="en-US" altLang="ko-KR" dirty="0">
+                <a:latin typeface="HY동녘M" panose="02030600000101010101" pitchFamily="18" charset="-127"/>
+                <a:ea typeface="HY동녘M" panose="02030600000101010101" pitchFamily="18" charset="-127"/>
+              </a:rPr>
+              <a:t>TEST TEXT</a:t>
+            </a:r>
+            <a:endParaRPr lang="ko-KR" altLang="en-US" dirty="0">
+              <a:latin typeface="HY동녘M" panose="02030600000101010101" pitchFamily="18" charset="-127"/>
+              <a:ea typeface="HY동녘M" panose="02030600000101010101" pitchFamily="18" charset="-127"/>
+            </a:endParaRPr>
+          </a:p>
+        </p:txBody>
+      </p:sp>
+      <p:sp>
+        <p:nvSpPr>
+          <p:cNvPr id="5" name="TextBox 1">
+            <a:extLst>
+              <a:ext uri="{FF2B5EF4-FFF2-40B4-BE49-F238E27FC236}">
+                <a16:creationId xmlns:a16="http://schemas.microsoft.com/office/drawing/2014/main" id="{E688C1F2-6F0F-3DE2-E139-EFFCB1105EA4}"/>
+              </a:ext>
+            </a:extLst>
+          </p:cNvPr>
+          <p:cNvSpPr txBox="1"/>
+          <p:nvPr/>
+        </p:nvSpPr>
+        <p:spPr>
+          <a:xfrm>
+            <a:off x="838200" y="590550"/>
+            <a:ext cx="1371600" cy="369332"/>
+          </a:xfrm>
+          <a:prstGeom prst="rect">
+            <a:avLst/>
+          </a:prstGeom>
+          <a:noFill/>
+        </p:spPr>
+        <p:txBody>
+          <a:bodyPr wrap="square" rtlCol="0">
+            <a:spAutoFit/>
+          </a:bodyPr>
+          <a:lstStyle/>
+          <a:p>
+            <a:r>
+              <a:rPr lang="en-US" altLang="ko-KR" dirty="0"/>
+              <a:t> </a:t>
+            </a:r>
+            <a:endParaRPr lang="ko-KR" altLang="en-US" dirty="0"/>
+          </a:p>
+        </p:txBody>
+      </p:sp>
+    </p:spTree>
+    <p:extLst>
+      <p:ext uri="{BB962C8B-B14F-4D97-AF65-F5344CB8AC3E}">
+        <p14:creationId xmlns:p14="http://schemas.microsoft.com/office/powerpoint/2010/main" val="2846031493"/>
       </p:ext>
     </p:extLst>
   </p:cSld>

</xml_diff>